<commit_message>
Aggiunte misurazioni sperimentali r0 e Va
</commit_message>
<xml_diff>
--- a/Microelectronics Mod. B - Valle/RelazioneProgettoOTA_AnfusoCaligiuri.pptx
+++ b/Microelectronics Mod. B - Valle/RelazioneProgettoOTA_AnfusoCaligiuri.pptx
@@ -105,10 +105,6 @@
     </a:lvl9pPr>
   </p:defaultTextStyle>
 </p:presentation>
-</file>
-
-<file path=ppt/revisionInfo.xml><?xml version="1.0" encoding="utf-8"?>
-<p1510:revInfo xmlns:a="http://schemas.openxmlformats.org/drawingml/2006/main" xmlns:r="http://schemas.openxmlformats.org/officeDocument/2006/relationships" xmlns:p1510="http://schemas.microsoft.com/office/powerpoint/2015/10/main"/>
 </file>
 
 <file path=ppt/slideLayouts/slideLayout1.xml><?xml version="1.0" encoding="utf-8"?>
@@ -6022,7 +6018,10 @@
           <a:bodyPr/>
           <a:lstStyle/>
           <a:p>
-            <a:endParaRPr lang="it-IT"/>
+            <a:r>
+              <a:rPr lang="it-IT" dirty="0"/>
+              <a:t>Progetto OTA</a:t>
+            </a:r>
           </a:p>
         </p:txBody>
       </p:sp>
@@ -6047,7 +6046,26 @@
           <a:bodyPr/>
           <a:lstStyle/>
           <a:p>
-            <a:endParaRPr lang="it-IT"/>
+            <a:r>
+              <a:rPr lang="it-IT" dirty="0"/>
+              <a:t>Anfuso </a:t>
+            </a:r>
+            <a:r>
+              <a:rPr lang="it-IT" dirty="0" err="1"/>
+              <a:t>emanuele</a:t>
+            </a:r>
+            <a:endParaRPr lang="it-IT" dirty="0"/>
+          </a:p>
+          <a:p>
+            <a:r>
+              <a:rPr lang="it-IT" dirty="0"/>
+              <a:t>Caligiuri </a:t>
+            </a:r>
+            <a:r>
+              <a:rPr lang="it-IT" dirty="0" err="1"/>
+              <a:t>alessio</a:t>
+            </a:r>
+            <a:endParaRPr lang="it-IT" dirty="0"/>
           </a:p>
         </p:txBody>
       </p:sp>

</xml_diff>